<commit_message>
Entrega - Proyecto 2
</commit_message>
<xml_diff>
--- a/Proyecto 1/Presentacion Proyecto 2.pptx
+++ b/Proyecto 1/Presentacion Proyecto 2.pptx
@@ -125,6 +125,11 @@
             <a:srgbClr val="A4A3A4"/>
           </p15:clr>
         </p15:guide>
+        <p15:guide id="2" orient="horz" pos="2160">
+          <p15:clr>
+            <a:srgbClr val="A4A3A4"/>
+          </p15:clr>
+        </p15:guide>
       </p15:sldGuideLst>
     </p:ext>
   </p:extLst>
@@ -175,7 +180,7 @@
           </a:lstStyle>
           <a:p>
             <a:r>
-              <a:rPr lang="en-US" smtClean="0"/>
+              <a:rPr lang="en-US"/>
               <a:t>Click to edit Master title style</a:t>
             </a:r>
             <a:endParaRPr lang="en-US" dirty="0"/>
@@ -246,7 +251,7 @@
           </a:lstStyle>
           <a:p>
             <a:r>
-              <a:rPr lang="en-US" smtClean="0"/>
+              <a:rPr lang="en-US"/>
               <a:t>Click to edit Master subtitle style</a:t>
             </a:r>
             <a:endParaRPr lang="en-US" dirty="0"/>
@@ -270,7 +275,7 @@
           <a:p>
             <a:fld id="{48A87A34-81AB-432B-8DAE-1953F412C126}" type="datetimeFigureOut">
               <a:rPr lang="en-US" dirty="0"/>
-              <a:t>11/6/2019</a:t>
+              <a:t>11/8/2019</a:t>
             </a:fld>
             <a:endParaRPr lang="en-US" dirty="0"/>
           </a:p>
@@ -322,7 +327,7 @@
           <a:p>
             <a:fld id="{6D22F896-40B5-4ADD-8801-0D06FADFA095}" type="slidenum">
               <a:rPr lang="en-US" dirty="0"/>
-              <a:t>‹#›</a:t>
+              <a:t>‹Nº›</a:t>
             </a:fld>
             <a:endParaRPr lang="en-US" dirty="0"/>
           </a:p>
@@ -400,7 +405,7 @@
           <a:lstStyle/>
           <a:p>
             <a:r>
-              <a:rPr lang="en-US" smtClean="0"/>
+              <a:rPr lang="en-US"/>
               <a:t>Click to edit Master title style</a:t>
             </a:r>
             <a:endParaRPr lang="en-US" dirty="0"/>
@@ -424,35 +429,35 @@
           <a:p>
             <a:pPr lvl="0"/>
             <a:r>
-              <a:rPr lang="en-US" smtClean="0"/>
+              <a:rPr lang="en-US"/>
               <a:t>Edit Master text styles</a:t>
             </a:r>
           </a:p>
           <a:p>
             <a:pPr lvl="1"/>
             <a:r>
-              <a:rPr lang="en-US" smtClean="0"/>
+              <a:rPr lang="en-US"/>
               <a:t>Second level</a:t>
             </a:r>
           </a:p>
           <a:p>
             <a:pPr lvl="2"/>
             <a:r>
-              <a:rPr lang="en-US" smtClean="0"/>
+              <a:rPr lang="en-US"/>
               <a:t>Third level</a:t>
             </a:r>
           </a:p>
           <a:p>
             <a:pPr lvl="3"/>
             <a:r>
-              <a:rPr lang="en-US" smtClean="0"/>
+              <a:rPr lang="en-US"/>
               <a:t>Fourth level</a:t>
             </a:r>
           </a:p>
           <a:p>
             <a:pPr lvl="4"/>
             <a:r>
-              <a:rPr lang="en-US" smtClean="0"/>
+              <a:rPr lang="en-US"/>
               <a:t>Fifth level</a:t>
             </a:r>
             <a:endParaRPr lang="en-US" dirty="0"/>
@@ -476,7 +481,7 @@
           <a:p>
             <a:fld id="{48A87A34-81AB-432B-8DAE-1953F412C126}" type="datetimeFigureOut">
               <a:rPr lang="en-US" dirty="0"/>
-              <a:t>11/6/2019</a:t>
+              <a:t>11/8/2019</a:t>
             </a:fld>
             <a:endParaRPr lang="en-US" dirty="0"/>
           </a:p>
@@ -518,7 +523,7 @@
           <a:p>
             <a:fld id="{6D22F896-40B5-4ADD-8801-0D06FADFA095}" type="slidenum">
               <a:rPr lang="en-US" dirty="0"/>
-              <a:t>‹#›</a:t>
+              <a:t>‹Nº›</a:t>
             </a:fld>
             <a:endParaRPr lang="en-US" dirty="0"/>
           </a:p>
@@ -605,7 +610,7 @@
           </a:lstStyle>
           <a:p>
             <a:r>
-              <a:rPr lang="en-US" smtClean="0"/>
+              <a:rPr lang="en-US"/>
               <a:t>Click to edit Master title style</a:t>
             </a:r>
             <a:endParaRPr lang="en-US" dirty="0"/>
@@ -634,35 +639,35 @@
           <a:p>
             <a:pPr lvl="0"/>
             <a:r>
-              <a:rPr lang="en-US" smtClean="0"/>
+              <a:rPr lang="en-US"/>
               <a:t>Edit Master text styles</a:t>
             </a:r>
           </a:p>
           <a:p>
             <a:pPr lvl="1"/>
             <a:r>
-              <a:rPr lang="en-US" smtClean="0"/>
+              <a:rPr lang="en-US"/>
               <a:t>Second level</a:t>
             </a:r>
           </a:p>
           <a:p>
             <a:pPr lvl="2"/>
             <a:r>
-              <a:rPr lang="en-US" smtClean="0"/>
+              <a:rPr lang="en-US"/>
               <a:t>Third level</a:t>
             </a:r>
           </a:p>
           <a:p>
             <a:pPr lvl="3"/>
             <a:r>
-              <a:rPr lang="en-US" smtClean="0"/>
+              <a:rPr lang="en-US"/>
               <a:t>Fourth level</a:t>
             </a:r>
           </a:p>
           <a:p>
             <a:pPr lvl="4"/>
             <a:r>
-              <a:rPr lang="en-US" smtClean="0"/>
+              <a:rPr lang="en-US"/>
               <a:t>Fifth level</a:t>
             </a:r>
             <a:endParaRPr lang="en-US" dirty="0"/>
@@ -686,7 +691,7 @@
           <a:p>
             <a:fld id="{48A87A34-81AB-432B-8DAE-1953F412C126}" type="datetimeFigureOut">
               <a:rPr lang="en-US" dirty="0"/>
-              <a:t>11/6/2019</a:t>
+              <a:t>11/8/2019</a:t>
             </a:fld>
             <a:endParaRPr lang="en-US" dirty="0"/>
           </a:p>
@@ -728,7 +733,7 @@
           <a:p>
             <a:fld id="{6D22F896-40B5-4ADD-8801-0D06FADFA095}" type="slidenum">
               <a:rPr lang="en-US" dirty="0"/>
-              <a:t>‹#›</a:t>
+              <a:t>‹Nº›</a:t>
             </a:fld>
             <a:endParaRPr lang="en-US" dirty="0"/>
           </a:p>
@@ -806,7 +811,7 @@
           <a:lstStyle/>
           <a:p>
             <a:r>
-              <a:rPr lang="en-US" smtClean="0"/>
+              <a:rPr lang="en-US"/>
               <a:t>Click to edit Master title style</a:t>
             </a:r>
             <a:endParaRPr lang="en-US" dirty="0"/>
@@ -830,35 +835,35 @@
           <a:p>
             <a:pPr lvl="0"/>
             <a:r>
-              <a:rPr lang="en-US" smtClean="0"/>
+              <a:rPr lang="en-US"/>
               <a:t>Edit Master text styles</a:t>
             </a:r>
           </a:p>
           <a:p>
             <a:pPr lvl="1"/>
             <a:r>
-              <a:rPr lang="en-US" smtClean="0"/>
+              <a:rPr lang="en-US"/>
               <a:t>Second level</a:t>
             </a:r>
           </a:p>
           <a:p>
             <a:pPr lvl="2"/>
             <a:r>
-              <a:rPr lang="en-US" smtClean="0"/>
+              <a:rPr lang="en-US"/>
               <a:t>Third level</a:t>
             </a:r>
           </a:p>
           <a:p>
             <a:pPr lvl="3"/>
             <a:r>
-              <a:rPr lang="en-US" smtClean="0"/>
+              <a:rPr lang="en-US"/>
               <a:t>Fourth level</a:t>
             </a:r>
           </a:p>
           <a:p>
             <a:pPr lvl="4"/>
             <a:r>
-              <a:rPr lang="en-US" smtClean="0"/>
+              <a:rPr lang="en-US"/>
               <a:t>Fifth level</a:t>
             </a:r>
             <a:endParaRPr lang="en-US" dirty="0"/>
@@ -882,7 +887,7 @@
           <a:p>
             <a:fld id="{48A87A34-81AB-432B-8DAE-1953F412C126}" type="datetimeFigureOut">
               <a:rPr lang="en-US" dirty="0"/>
-              <a:t>11/6/2019</a:t>
+              <a:t>11/8/2019</a:t>
             </a:fld>
             <a:endParaRPr lang="en-US" dirty="0"/>
           </a:p>
@@ -924,7 +929,7 @@
           <a:p>
             <a:fld id="{6D22F896-40B5-4ADD-8801-0D06FADFA095}" type="slidenum">
               <a:rPr lang="en-US" dirty="0"/>
-              <a:t>‹#›</a:t>
+              <a:t>‹Nº›</a:t>
             </a:fld>
             <a:endParaRPr lang="en-US" dirty="0"/>
           </a:p>
@@ -1013,7 +1018,7 @@
           </a:lstStyle>
           <a:p>
             <a:r>
-              <a:rPr lang="en-US" smtClean="0"/>
+              <a:rPr lang="en-US"/>
               <a:t>Click to edit Master title style</a:t>
             </a:r>
             <a:endParaRPr lang="en-US" dirty="0"/>
@@ -1133,7 +1138,7 @@
           <a:p>
             <a:pPr lvl="0"/>
             <a:r>
-              <a:rPr lang="en-US" smtClean="0"/>
+              <a:rPr lang="en-US"/>
               <a:t>Edit Master text styles</a:t>
             </a:r>
           </a:p>
@@ -1156,7 +1161,7 @@
           <a:p>
             <a:fld id="{48A87A34-81AB-432B-8DAE-1953F412C126}" type="datetimeFigureOut">
               <a:rPr lang="en-US" dirty="0"/>
-              <a:t>11/6/2019</a:t>
+              <a:t>11/8/2019</a:t>
             </a:fld>
             <a:endParaRPr lang="en-US" dirty="0"/>
           </a:p>
@@ -1198,7 +1203,7 @@
           <a:p>
             <a:fld id="{6D22F896-40B5-4ADD-8801-0D06FADFA095}" type="slidenum">
               <a:rPr lang="en-US" dirty="0"/>
-              <a:t>‹#›</a:t>
+              <a:t>‹Nº›</a:t>
             </a:fld>
             <a:endParaRPr lang="en-US" dirty="0"/>
           </a:p>
@@ -1281,7 +1286,7 @@
           <a:lstStyle/>
           <a:p>
             <a:r>
-              <a:rPr lang="en-US" smtClean="0"/>
+              <a:rPr lang="en-US"/>
               <a:t>Click to edit Master title style</a:t>
             </a:r>
             <a:endParaRPr lang="en-US" dirty="0"/>
@@ -1310,35 +1315,35 @@
           <a:p>
             <a:pPr lvl="0"/>
             <a:r>
-              <a:rPr lang="en-US" smtClean="0"/>
+              <a:rPr lang="en-US"/>
               <a:t>Edit Master text styles</a:t>
             </a:r>
           </a:p>
           <a:p>
             <a:pPr lvl="1"/>
             <a:r>
-              <a:rPr lang="en-US" smtClean="0"/>
+              <a:rPr lang="en-US"/>
               <a:t>Second level</a:t>
             </a:r>
           </a:p>
           <a:p>
             <a:pPr lvl="2"/>
             <a:r>
-              <a:rPr lang="en-US" smtClean="0"/>
+              <a:rPr lang="en-US"/>
               <a:t>Third level</a:t>
             </a:r>
           </a:p>
           <a:p>
             <a:pPr lvl="3"/>
             <a:r>
-              <a:rPr lang="en-US" smtClean="0"/>
+              <a:rPr lang="en-US"/>
               <a:t>Fourth level</a:t>
             </a:r>
           </a:p>
           <a:p>
             <a:pPr lvl="4"/>
             <a:r>
-              <a:rPr lang="en-US" smtClean="0"/>
+              <a:rPr lang="en-US"/>
               <a:t>Fifth level</a:t>
             </a:r>
             <a:endParaRPr lang="en-US" dirty="0"/>
@@ -1367,35 +1372,35 @@
           <a:p>
             <a:pPr lvl="0"/>
             <a:r>
-              <a:rPr lang="en-US" smtClean="0"/>
+              <a:rPr lang="en-US"/>
               <a:t>Edit Master text styles</a:t>
             </a:r>
           </a:p>
           <a:p>
             <a:pPr lvl="1"/>
             <a:r>
-              <a:rPr lang="en-US" smtClean="0"/>
+              <a:rPr lang="en-US"/>
               <a:t>Second level</a:t>
             </a:r>
           </a:p>
           <a:p>
             <a:pPr lvl="2"/>
             <a:r>
-              <a:rPr lang="en-US" smtClean="0"/>
+              <a:rPr lang="en-US"/>
               <a:t>Third level</a:t>
             </a:r>
           </a:p>
           <a:p>
             <a:pPr lvl="3"/>
             <a:r>
-              <a:rPr lang="en-US" smtClean="0"/>
+              <a:rPr lang="en-US"/>
               <a:t>Fourth level</a:t>
             </a:r>
           </a:p>
           <a:p>
             <a:pPr lvl="4"/>
             <a:r>
-              <a:rPr lang="en-US" smtClean="0"/>
+              <a:rPr lang="en-US"/>
               <a:t>Fifth level</a:t>
             </a:r>
             <a:endParaRPr lang="en-US" dirty="0"/>
@@ -1419,7 +1424,7 @@
           <a:p>
             <a:fld id="{48A87A34-81AB-432B-8DAE-1953F412C126}" type="datetimeFigureOut">
               <a:rPr lang="en-US" dirty="0"/>
-              <a:t>11/6/2019</a:t>
+              <a:t>11/8/2019</a:t>
             </a:fld>
             <a:endParaRPr lang="en-US" dirty="0"/>
           </a:p>
@@ -1461,7 +1466,7 @@
           <a:p>
             <a:fld id="{6D22F896-40B5-4ADD-8801-0D06FADFA095}" type="slidenum">
               <a:rPr lang="en-US" dirty="0"/>
-              <a:t>‹#›</a:t>
+              <a:t>‹Nº›</a:t>
             </a:fld>
             <a:endParaRPr lang="en-US" dirty="0"/>
           </a:p>
@@ -1544,7 +1549,7 @@
           <a:lstStyle/>
           <a:p>
             <a:r>
-              <a:rPr lang="en-US" smtClean="0"/>
+              <a:rPr lang="en-US"/>
               <a:t>Click to edit Master title style</a:t>
             </a:r>
             <a:endParaRPr lang="en-US" dirty="0"/>
@@ -1619,7 +1624,7 @@
           <a:p>
             <a:pPr lvl="0"/>
             <a:r>
-              <a:rPr lang="en-US" smtClean="0"/>
+              <a:rPr lang="en-US"/>
               <a:t>Edit Master text styles</a:t>
             </a:r>
           </a:p>
@@ -1647,35 +1652,35 @@
           <a:p>
             <a:pPr lvl="0"/>
             <a:r>
-              <a:rPr lang="en-US" smtClean="0"/>
+              <a:rPr lang="en-US"/>
               <a:t>Edit Master text styles</a:t>
             </a:r>
           </a:p>
           <a:p>
             <a:pPr lvl="1"/>
             <a:r>
-              <a:rPr lang="en-US" smtClean="0"/>
+              <a:rPr lang="en-US"/>
               <a:t>Second level</a:t>
             </a:r>
           </a:p>
           <a:p>
             <a:pPr lvl="2"/>
             <a:r>
-              <a:rPr lang="en-US" smtClean="0"/>
+              <a:rPr lang="en-US"/>
               <a:t>Third level</a:t>
             </a:r>
           </a:p>
           <a:p>
             <a:pPr lvl="3"/>
             <a:r>
-              <a:rPr lang="en-US" smtClean="0"/>
+              <a:rPr lang="en-US"/>
               <a:t>Fourth level</a:t>
             </a:r>
           </a:p>
           <a:p>
             <a:pPr lvl="4"/>
             <a:r>
-              <a:rPr lang="en-US" smtClean="0"/>
+              <a:rPr lang="en-US"/>
               <a:t>Fifth level</a:t>
             </a:r>
             <a:endParaRPr lang="en-US" dirty="0"/>
@@ -1750,7 +1755,7 @@
           <a:p>
             <a:pPr lvl="0"/>
             <a:r>
-              <a:rPr lang="en-US" smtClean="0"/>
+              <a:rPr lang="en-US"/>
               <a:t>Edit Master text styles</a:t>
             </a:r>
           </a:p>
@@ -1778,35 +1783,35 @@
           <a:p>
             <a:pPr lvl="0"/>
             <a:r>
-              <a:rPr lang="en-US" smtClean="0"/>
+              <a:rPr lang="en-US"/>
               <a:t>Edit Master text styles</a:t>
             </a:r>
           </a:p>
           <a:p>
             <a:pPr lvl="1"/>
             <a:r>
-              <a:rPr lang="en-US" smtClean="0"/>
+              <a:rPr lang="en-US"/>
               <a:t>Second level</a:t>
             </a:r>
           </a:p>
           <a:p>
             <a:pPr lvl="2"/>
             <a:r>
-              <a:rPr lang="en-US" smtClean="0"/>
+              <a:rPr lang="en-US"/>
               <a:t>Third level</a:t>
             </a:r>
           </a:p>
           <a:p>
             <a:pPr lvl="3"/>
             <a:r>
-              <a:rPr lang="en-US" smtClean="0"/>
+              <a:rPr lang="en-US"/>
               <a:t>Fourth level</a:t>
             </a:r>
           </a:p>
           <a:p>
             <a:pPr lvl="4"/>
             <a:r>
-              <a:rPr lang="en-US" smtClean="0"/>
+              <a:rPr lang="en-US"/>
               <a:t>Fifth level</a:t>
             </a:r>
             <a:endParaRPr lang="en-US" dirty="0"/>
@@ -1830,7 +1835,7 @@
           <a:p>
             <a:fld id="{48A87A34-81AB-432B-8DAE-1953F412C126}" type="datetimeFigureOut">
               <a:rPr lang="en-US" dirty="0"/>
-              <a:t>11/6/2019</a:t>
+              <a:t>11/8/2019</a:t>
             </a:fld>
             <a:endParaRPr lang="en-US" dirty="0"/>
           </a:p>
@@ -1872,7 +1877,7 @@
           <a:p>
             <a:fld id="{6D22F896-40B5-4ADD-8801-0D06FADFA095}" type="slidenum">
               <a:rPr lang="en-US" dirty="0"/>
-              <a:t>‹#›</a:t>
+              <a:t>‹Nº›</a:t>
             </a:fld>
             <a:endParaRPr lang="en-US" dirty="0"/>
           </a:p>
@@ -1950,7 +1955,7 @@
           <a:lstStyle/>
           <a:p>
             <a:r>
-              <a:rPr lang="en-US" smtClean="0"/>
+              <a:rPr lang="en-US"/>
               <a:t>Click to edit Master title style</a:t>
             </a:r>
             <a:endParaRPr lang="en-US" dirty="0"/>
@@ -1974,7 +1979,7 @@
           <a:p>
             <a:fld id="{48A87A34-81AB-432B-8DAE-1953F412C126}" type="datetimeFigureOut">
               <a:rPr lang="en-US" dirty="0"/>
-              <a:t>11/6/2019</a:t>
+              <a:t>11/8/2019</a:t>
             </a:fld>
             <a:endParaRPr lang="en-US" dirty="0"/>
           </a:p>
@@ -2016,7 +2021,7 @@
           <a:p>
             <a:fld id="{6D22F896-40B5-4ADD-8801-0D06FADFA095}" type="slidenum">
               <a:rPr lang="en-US" dirty="0"/>
-              <a:t>‹#›</a:t>
+              <a:t>‹Nº›</a:t>
             </a:fld>
             <a:endParaRPr lang="en-US" dirty="0"/>
           </a:p>
@@ -2095,7 +2100,7 @@
           <a:p>
             <a:fld id="{48A87A34-81AB-432B-8DAE-1953F412C126}" type="datetimeFigureOut">
               <a:rPr lang="en-US" dirty="0"/>
-              <a:t>11/6/2019</a:t>
+              <a:t>11/8/2019</a:t>
             </a:fld>
             <a:endParaRPr lang="en-US" dirty="0"/>
           </a:p>
@@ -2137,7 +2142,7 @@
           <a:p>
             <a:fld id="{6D22F896-40B5-4ADD-8801-0D06FADFA095}" type="slidenum">
               <a:rPr lang="en-US" dirty="0"/>
-              <a:t>‹#›</a:t>
+              <a:t>‹Nº›</a:t>
             </a:fld>
             <a:endParaRPr lang="en-US" dirty="0"/>
           </a:p>
@@ -2195,7 +2200,7 @@
           </a:lstStyle>
           <a:p>
             <a:r>
-              <a:rPr lang="en-US" smtClean="0"/>
+              <a:rPr lang="en-US"/>
               <a:t>Click to edit Master title style</a:t>
             </a:r>
             <a:endParaRPr lang="en-US" dirty="0"/>
@@ -2224,35 +2229,35 @@
           <a:p>
             <a:pPr lvl="0"/>
             <a:r>
-              <a:rPr lang="en-US" smtClean="0"/>
+              <a:rPr lang="en-US"/>
               <a:t>Edit Master text styles</a:t>
             </a:r>
           </a:p>
           <a:p>
             <a:pPr lvl="1"/>
             <a:r>
-              <a:rPr lang="en-US" smtClean="0"/>
+              <a:rPr lang="en-US"/>
               <a:t>Second level</a:t>
             </a:r>
           </a:p>
           <a:p>
             <a:pPr lvl="2"/>
             <a:r>
-              <a:rPr lang="en-US" smtClean="0"/>
+              <a:rPr lang="en-US"/>
               <a:t>Third level</a:t>
             </a:r>
           </a:p>
           <a:p>
             <a:pPr lvl="3"/>
             <a:r>
-              <a:rPr lang="en-US" smtClean="0"/>
+              <a:rPr lang="en-US"/>
               <a:t>Fourth level</a:t>
             </a:r>
           </a:p>
           <a:p>
             <a:pPr lvl="4"/>
             <a:r>
-              <a:rPr lang="en-US" smtClean="0"/>
+              <a:rPr lang="en-US"/>
               <a:t>Fifth level</a:t>
             </a:r>
             <a:endParaRPr lang="en-US" dirty="0"/>
@@ -2318,7 +2323,7 @@
           <a:p>
             <a:pPr lvl="0"/>
             <a:r>
-              <a:rPr lang="en-US" smtClean="0"/>
+              <a:rPr lang="en-US"/>
               <a:t>Edit Master text styles</a:t>
             </a:r>
           </a:p>
@@ -2341,7 +2346,7 @@
           <a:p>
             <a:fld id="{48A87A34-81AB-432B-8DAE-1953F412C126}" type="datetimeFigureOut">
               <a:rPr lang="en-US" dirty="0"/>
-              <a:t>11/6/2019</a:t>
+              <a:t>11/8/2019</a:t>
             </a:fld>
             <a:endParaRPr lang="en-US" dirty="0"/>
           </a:p>
@@ -2383,7 +2388,7 @@
           <a:p>
             <a:fld id="{6D22F896-40B5-4ADD-8801-0D06FADFA095}" type="slidenum">
               <a:rPr lang="en-US" dirty="0"/>
-              <a:t>‹#›</a:t>
+              <a:t>‹Nº›</a:t>
             </a:fld>
             <a:endParaRPr lang="en-US" dirty="0"/>
           </a:p>
@@ -2606,7 +2611,7 @@
           </a:lstStyle>
           <a:p>
             <a:r>
-              <a:rPr lang="en-US" smtClean="0"/>
+              <a:rPr lang="en-US"/>
               <a:t>Click to edit Master title style</a:t>
             </a:r>
             <a:endParaRPr lang="en-US" dirty="0"/>
@@ -2681,7 +2686,7 @@
           </a:lstStyle>
           <a:p>
             <a:r>
-              <a:rPr lang="en-US" smtClean="0"/>
+              <a:rPr lang="en-US"/>
               <a:t>Click icon to add picture</a:t>
             </a:r>
             <a:endParaRPr lang="en-US" dirty="0"/>
@@ -2749,7 +2754,7 @@
           <a:p>
             <a:pPr lvl="0"/>
             <a:r>
-              <a:rPr lang="en-US" smtClean="0"/>
+              <a:rPr lang="en-US"/>
               <a:t>Edit Master text styles</a:t>
             </a:r>
           </a:p>
@@ -2782,7 +2787,7 @@
             <a:fld id="{48A87A34-81AB-432B-8DAE-1953F412C126}" type="datetimeFigureOut">
               <a:rPr lang="en-US" dirty="0"/>
               <a:pPr/>
-              <a:t>11/6/2019</a:t>
+              <a:t>11/8/2019</a:t>
             </a:fld>
             <a:endParaRPr lang="en-US" dirty="0"/>
           </a:p>
@@ -2829,7 +2834,7 @@
           <a:p>
             <a:fld id="{6D22F896-40B5-4ADD-8801-0D06FADFA095}" type="slidenum">
               <a:rPr lang="en-US" dirty="0"/>
-              <a:t>‹#›</a:t>
+              <a:t>‹Nº›</a:t>
             </a:fld>
             <a:endParaRPr lang="en-US" dirty="0"/>
           </a:p>
@@ -3000,7 +3005,7 @@
           <a:lstStyle/>
           <a:p>
             <a:r>
-              <a:rPr lang="en-US" smtClean="0"/>
+              <a:rPr lang="en-US"/>
               <a:t>Click to edit Master title style</a:t>
             </a:r>
             <a:endParaRPr lang="en-US" dirty="0"/>
@@ -3104,7 +3109,7 @@
             <a:fld id="{48A87A34-81AB-432B-8DAE-1953F412C126}" type="datetimeFigureOut">
               <a:rPr lang="en-US" dirty="0"/>
               <a:pPr/>
-              <a:t>11/6/2019</a:t>
+              <a:t>11/8/2019</a:t>
             </a:fld>
             <a:endParaRPr lang="en-US" dirty="0"/>
           </a:p>
@@ -3181,7 +3186,7 @@
             <a:fld id="{6D22F896-40B5-4ADD-8801-0D06FADFA095}" type="slidenum">
               <a:rPr lang="en-US" dirty="0"/>
               <a:pPr/>
-              <a:t>‹#›</a:t>
+              <a:t>‹Nº›</a:t>
             </a:fld>
             <a:endParaRPr lang="en-US" dirty="0"/>
           </a:p>
@@ -3615,37 +3620,28 @@
               <a:rPr lang="en-US" sz="4000" dirty="0"/>
               <a:t> </a:t>
             </a:r>
-            <a:r>
-              <a:rPr lang="en-US" sz="4000" dirty="0" smtClean="0"/>
-              <a:t/>
-            </a:r>
             <a:br>
-              <a:rPr lang="en-US" sz="4000" dirty="0" smtClean="0"/>
+              <a:rPr lang="en-US" sz="4000" dirty="0"/>
             </a:br>
             <a:r>
-              <a:rPr lang="en-US" sz="4000" dirty="0" smtClean="0"/>
+              <a:rPr lang="en-US" sz="4000" dirty="0"/>
               <a:t>Segundo </a:t>
             </a:r>
             <a:r>
-              <a:rPr lang="en-US" sz="4000" dirty="0" err="1"/>
+              <a:rPr lang="es-AR" sz="4000" dirty="0"/>
               <a:t>Cuatrimestre</a:t>
             </a:r>
             <a:r>
               <a:rPr lang="en-US" sz="4000" dirty="0"/>
-              <a:t> </a:t>
-            </a:r>
-            <a:r>
-              <a:rPr lang="en-US" sz="4000" dirty="0" smtClean="0"/>
-              <a:t>2019</a:t>
+              <a:t> 2019</a:t>
             </a:r>
             <a:br>
-              <a:rPr lang="en-US" sz="4000" dirty="0" smtClean="0"/>
+              <a:rPr lang="en-US" sz="4000" dirty="0"/>
             </a:br>
             <a:r>
-              <a:rPr lang="en-US" sz="2000" dirty="0" smtClean="0"/>
+              <a:rPr lang="en-US" sz="2000" dirty="0"/>
               <a:t>Sub Proyecto 2</a:t>
             </a:r>
-            <a:endParaRPr lang="en-US" sz="2000" dirty="0"/>
           </a:p>
         </p:txBody>
       </p:sp>
@@ -3665,13 +3661,13 @@
           <a:lstStyle/>
           <a:p>
             <a:r>
-              <a:rPr lang="es-AR" dirty="0" smtClean="0"/>
+              <a:rPr lang="es-AR" dirty="0"/>
               <a:t>Brunner Francisco - 102242</a:t>
             </a:r>
           </a:p>
           <a:p>
             <a:r>
-              <a:rPr lang="es-AR" dirty="0" smtClean="0"/>
+              <a:rPr lang="es-AR" dirty="0"/>
               <a:t>Meneses Christian - 93619</a:t>
             </a:r>
             <a:endParaRPr lang="en-US" dirty="0"/>
@@ -3724,8 +3720,8 @@
           <a:lstStyle/>
           <a:p>
             <a:r>
-              <a:rPr lang="es-AR" dirty="0" smtClean="0"/>
-              <a:t>Mapas de textura.</a:t>
+              <a:rPr lang="es-AR" dirty="0"/>
+              <a:t>texturas</a:t>
             </a:r>
             <a:endParaRPr lang="en-US" dirty="0"/>
           </a:p>
@@ -3754,33 +3750,29 @@
           <a:lstStyle/>
           <a:p>
             <a:r>
-              <a:rPr lang="es-AR" dirty="0" smtClean="0"/>
-              <a:t>Utilizamos mapas de textura en los 3 tipos de edificios, donde nos encontramos de la problemática aun actualmente tratando de resolverlo, la cual es no poder plasmar cada parte del mapa de la textura con sus respectivos vértices.</a:t>
-            </a:r>
-          </a:p>
-          <a:p>
-            <a:r>
-              <a:rPr lang="es-AR" dirty="0" smtClean="0"/>
+              <a:rPr lang="es-AR" dirty="0"/>
+              <a:t>Utilizamos mapas de textura en los 3 tipos de edificios, aunque pudimos mapear las texturas a los objetos no logramos coincidir las coordenadas UV del objeto con las coordenadas de las imágenes de textura.</a:t>
+            </a:r>
+          </a:p>
+          <a:p>
+            <a:r>
+              <a:rPr lang="es-AR" dirty="0"/>
               <a:t>En lo que respecta a los vértices, cada modelo fue pasado a </a:t>
             </a:r>
             <a:r>
               <a:rPr lang="es-AR" dirty="0" err="1"/>
-              <a:t>B</a:t>
-            </a:r>
-            <a:r>
-              <a:rPr lang="es-AR" dirty="0" err="1" smtClean="0"/>
-              <a:t>lender</a:t>
-            </a:r>
-            <a:r>
-              <a:rPr lang="es-AR" dirty="0" smtClean="0"/>
+              <a:t>Blender</a:t>
+            </a:r>
+            <a:r>
+              <a:rPr lang="es-AR" dirty="0"/>
               <a:t>, y creado las UV para la textura seleccionada. Creemos que el problema se encuentra en la transformación de </a:t>
             </a:r>
             <a:r>
-              <a:rPr lang="es-AR" dirty="0" err="1" smtClean="0"/>
+              <a:rPr lang="es-AR" dirty="0" err="1"/>
               <a:t>webgl</a:t>
             </a:r>
             <a:r>
-              <a:rPr lang="es-AR" dirty="0" smtClean="0"/>
+              <a:rPr lang="es-AR" dirty="0"/>
               <a:t> de los UV del OBJ.</a:t>
             </a:r>
             <a:endParaRPr lang="en-US" dirty="0"/>
@@ -3847,6 +3839,41 @@
           </a:prstGeom>
         </p:spPr>
       </p:pic>
+      <p:sp>
+        <p:nvSpPr>
+          <p:cNvPr id="4" name="CuadroTexto 3">
+            <a:extLst>
+              <a:ext uri="{FF2B5EF4-FFF2-40B4-BE49-F238E27FC236}">
+                <a16:creationId xmlns:a16="http://schemas.microsoft.com/office/drawing/2014/main" id="{8113A97C-6EDB-4D5F-ABF8-F3E6523D80A7}"/>
+              </a:ext>
+            </a:extLst>
+          </p:cNvPr>
+          <p:cNvSpPr txBox="1"/>
+          <p:nvPr/>
+        </p:nvSpPr>
+        <p:spPr>
+          <a:xfrm>
+            <a:off x="8942082" y="749766"/>
+            <a:ext cx="2112770" cy="584775"/>
+          </a:xfrm>
+          <a:prstGeom prst="rect">
+            <a:avLst/>
+          </a:prstGeom>
+          <a:noFill/>
+        </p:spPr>
+        <p:txBody>
+          <a:bodyPr wrap="square" rtlCol="0">
+            <a:spAutoFit/>
+          </a:bodyPr>
+          <a:lstStyle/>
+          <a:p>
+            <a:r>
+              <a:rPr lang="es-ES" sz="3200" dirty="0"/>
+              <a:t>Dificultades</a:t>
+            </a:r>
+          </a:p>
+        </p:txBody>
+      </p:sp>
     </p:spTree>
     <p:extLst>
       <p:ext uri="{BB962C8B-B14F-4D97-AF65-F5344CB8AC3E}">
@@ -3893,8 +3920,8 @@
           <a:lstStyle/>
           <a:p>
             <a:r>
-              <a:rPr lang="es-AR" dirty="0" smtClean="0"/>
-              <a:t>Textura</a:t>
+              <a:rPr lang="es-AR" dirty="0"/>
+              <a:t>Texturas</a:t>
             </a:r>
             <a:endParaRPr lang="en-US" dirty="0"/>
           </a:p>
@@ -3921,13 +3948,13 @@
           <a:lstStyle/>
           <a:p>
             <a:r>
-              <a:rPr lang="es-AR" dirty="0" smtClean="0"/>
+              <a:rPr lang="es-AR" dirty="0"/>
               <a:t>A los objetos antes mencionados se le aplican dos tipos de texturas diferentes, una procedural (madera) y otras 2D.  </a:t>
             </a:r>
           </a:p>
           <a:p>
             <a:r>
-              <a:rPr lang="es-AR" dirty="0" smtClean="0"/>
+              <a:rPr lang="es-AR" dirty="0"/>
               <a:t>También usamos texturas para representar los diferentes tipos de suelos, donde se encuentran la calle, las veredas y la plaza.</a:t>
             </a:r>
             <a:endParaRPr lang="en-US" dirty="0"/>
@@ -4071,15 +4098,7 @@
           <a:p>
             <a:r>
               <a:rPr lang="es-AR" dirty="0"/>
-              <a:t>Constitución y estética de la </a:t>
-            </a:r>
-            <a:r>
-              <a:rPr lang="es-AR" dirty="0" smtClean="0"/>
-              <a:t>escena</a:t>
-            </a:r>
-            <a:r>
-              <a:rPr lang="es-AR" dirty="0"/>
-              <a:t/>
+              <a:t>Constitución y estética de la escena</a:t>
             </a:r>
             <a:br>
               <a:rPr lang="es-AR" dirty="0"/>
@@ -4115,7 +4134,7 @@
           </a:p>
           <a:p>
             <a:r>
-              <a:rPr lang="es-ES" dirty="0" smtClean="0"/>
+              <a:rPr lang="es-ES" dirty="0"/>
               <a:t>La escena puede recorrerse y verse desde amplios puntos de vista, tantos cercanos como alejados.</a:t>
             </a:r>
             <a:endParaRPr lang="en-US" dirty="0"/>
@@ -4289,20 +4308,19 @@
           <a:lstStyle/>
           <a:p>
             <a:r>
-              <a:rPr lang="es-AR" dirty="0" smtClean="0"/>
+              <a:rPr lang="es-AR" dirty="0"/>
               <a:t>Se pueden variar mediante un slider la intensidad de las luces, así como también mediante una botonera cambiar el ambiente a día, atardecer o noche. Con esto y gracias a que va cambiando la luz del ambiente se puede apreciar el día con su respectivo cielo soleado, en el caso del atardecer se aprecia un ocaso, y por el lado de la noche un cielo estrellado.</a:t>
             </a:r>
           </a:p>
           <a:p>
             <a:r>
-              <a:rPr lang="es-AR" dirty="0" smtClean="0"/>
-              <a:t>La cámara que se implemento fue una cámara primera persona, la cual permite recorrer toda la plaza, y apreciar los diferentes aspectos. </a:t>
-            </a:r>
-            <a:endParaRPr lang="es-AR" dirty="0"/>
-          </a:p>
-          <a:p>
-            <a:r>
-              <a:rPr lang="es-AR" dirty="0" smtClean="0"/>
+              <a:rPr lang="es-AR" dirty="0"/>
+              <a:t>La cámara que se implemento fue una cámara primera persona, que permite recorrer toda la plaza, y apreciar los diferentes aspectos. </a:t>
+            </a:r>
+          </a:p>
+          <a:p>
+            <a:r>
+              <a:rPr lang="es-AR" dirty="0"/>
               <a:t>A esta cámara le agregamos la posibilidad de ir hacia arriba y hacia abajo, con el fin de poder probar y ver desde diferentes puntos de vista, y no solo a nivel del suelo.</a:t>
             </a:r>
           </a:p>
@@ -4355,7 +4373,7 @@
           <a:p>
             <a:pPr algn="ctr"/>
             <a:r>
-              <a:rPr lang="es-AR" dirty="0" smtClean="0"/>
+              <a:rPr lang="es-AR" dirty="0"/>
               <a:t>DIA / ATARDECER / NOCHE</a:t>
             </a:r>
             <a:endParaRPr lang="en-US" dirty="0"/>
@@ -4498,11 +4516,11 @@
           <a:lstStyle/>
           <a:p>
             <a:r>
-              <a:rPr lang="es-AR" dirty="0" smtClean="0"/>
+              <a:rPr lang="es-AR" dirty="0"/>
               <a:t>INDICE</a:t>
             </a:r>
             <a:br>
-              <a:rPr lang="es-AR" dirty="0" smtClean="0"/>
+              <a:rPr lang="es-AR" dirty="0"/>
             </a:br>
             <a:endParaRPr lang="en-US" dirty="0"/>
           </a:p>
@@ -4524,51 +4542,51 @@
           <a:lstStyle/>
           <a:p>
             <a:r>
-              <a:rPr lang="es-AR" sz="1800" dirty="0" smtClean="0"/>
+              <a:rPr lang="es-AR" sz="1800" dirty="0"/>
               <a:t>Objetivos.</a:t>
             </a:r>
           </a:p>
           <a:p>
             <a:r>
-              <a:rPr lang="es-AR" sz="1800" dirty="0" smtClean="0"/>
+              <a:rPr lang="es-AR" sz="1800" dirty="0"/>
               <a:t>Desafío.</a:t>
             </a:r>
           </a:p>
           <a:p>
             <a:r>
-              <a:rPr lang="es-AR" sz="1800" dirty="0" smtClean="0"/>
+              <a:rPr lang="es-AR" sz="1800" dirty="0"/>
               <a:t>Construcción de la escena.</a:t>
             </a:r>
           </a:p>
           <a:p>
             <a:r>
-              <a:rPr lang="es-AR" sz="1800" dirty="0" smtClean="0"/>
+              <a:rPr lang="es-AR" sz="1800" dirty="0"/>
               <a:t>Tipo de luces.</a:t>
             </a:r>
           </a:p>
           <a:p>
             <a:r>
-              <a:rPr lang="es-AR" sz="1800" dirty="0" smtClean="0"/>
+              <a:rPr lang="es-AR" sz="1800" dirty="0"/>
               <a:t>Modelado de la luz.</a:t>
             </a:r>
           </a:p>
           <a:p>
             <a:r>
-              <a:rPr lang="es-AR" sz="1800" dirty="0" smtClean="0"/>
+              <a:rPr lang="es-AR" sz="1800" dirty="0"/>
               <a:t>Integración de las luces.</a:t>
             </a:r>
           </a:p>
           <a:p>
             <a:r>
-              <a:rPr lang="es-AR" sz="1800" dirty="0" smtClean="0"/>
+              <a:rPr lang="es-AR" sz="1800" dirty="0"/>
               <a:t>Material</a:t>
             </a:r>
           </a:p>
           <a:p>
-            <a:endParaRPr lang="es-AR" sz="1800" dirty="0" smtClean="0"/>
-          </a:p>
-          <a:p>
-            <a:endParaRPr lang="es-AR" dirty="0" smtClean="0"/>
+            <a:endParaRPr lang="es-AR" sz="1800" dirty="0"/>
+          </a:p>
+          <a:p>
+            <a:endParaRPr lang="es-AR" dirty="0"/>
           </a:p>
           <a:p>
             <a:endParaRPr lang="en-US" dirty="0"/>
@@ -4591,25 +4609,25 @@
           <a:lstStyle/>
           <a:p>
             <a:r>
-              <a:rPr lang="es-AR" sz="1800" dirty="0" smtClean="0"/>
+              <a:rPr lang="es-AR" sz="1800" dirty="0"/>
               <a:t>Mapas de textura.</a:t>
             </a:r>
           </a:p>
           <a:p>
             <a:r>
-              <a:rPr lang="es-AR" sz="1800" dirty="0" smtClean="0"/>
+              <a:rPr lang="es-AR" sz="1800" dirty="0"/>
               <a:t>Texturas.</a:t>
             </a:r>
           </a:p>
           <a:p>
             <a:r>
-              <a:rPr lang="es-AR" sz="1800" dirty="0" smtClean="0"/>
+              <a:rPr lang="es-AR" sz="1800" dirty="0"/>
               <a:t>Constitución y estética de la escena.</a:t>
             </a:r>
           </a:p>
           <a:p>
             <a:r>
-              <a:rPr lang="es-AR" sz="1800" dirty="0" smtClean="0"/>
+              <a:rPr lang="es-AR" sz="1800" dirty="0"/>
               <a:t>Las luces y la cámara.</a:t>
             </a:r>
           </a:p>
@@ -4689,7 +4707,7 @@
           <a:lstStyle/>
           <a:p>
             <a:r>
-              <a:rPr lang="es-AR" dirty="0" smtClean="0"/>
+              <a:rPr lang="es-AR" dirty="0"/>
               <a:t>OBJETIVOS</a:t>
             </a:r>
             <a:endParaRPr lang="en-US" dirty="0"/>
@@ -4716,8 +4734,9 @@
           <a:bodyPr/>
           <a:lstStyle/>
           <a:p>
-            <a:r>
-              <a:rPr lang="es-ES" dirty="0" smtClean="0"/>
+            <a:pPr algn="just"/>
+            <a:r>
+              <a:rPr lang="es-ES" dirty="0"/>
               <a:t>El objetivo del proyecto fue recrear el  “</a:t>
             </a:r>
             <a:r>
@@ -4725,40 +4744,8 @@
               <a:t>Champ-de-Mars</a:t>
             </a:r>
             <a:r>
-              <a:rPr lang="es-ES" dirty="0" smtClean="0"/>
-              <a:t>”, el cual es </a:t>
-            </a:r>
-            <a:r>
               <a:rPr lang="es-ES" dirty="0"/>
-              <a:t>un vasto </a:t>
-            </a:r>
-            <a:r>
-              <a:rPr lang="es-ES" dirty="0" smtClean="0"/>
-              <a:t>jardín público </a:t>
-            </a:r>
-            <a:r>
-              <a:rPr lang="es-ES" dirty="0"/>
-              <a:t>totalmente abierto situado en el </a:t>
-            </a:r>
-            <a:r>
-              <a:rPr lang="es-ES" dirty="0" smtClean="0"/>
-              <a:t>séptimo distrito de</a:t>
-            </a:r>
-            <a:r>
-              <a:rPr lang="es-ES" dirty="0"/>
-              <a:t> </a:t>
-            </a:r>
-            <a:r>
-              <a:rPr lang="es-ES" dirty="0" smtClean="0"/>
-              <a:t>Paris, en la cual se encuentra </a:t>
-            </a:r>
-            <a:r>
-              <a:rPr lang="es-ES" dirty="0"/>
-              <a:t>la Torre </a:t>
-            </a:r>
-            <a:r>
-              <a:rPr lang="es-ES" dirty="0" smtClean="0"/>
-              <a:t>Eiffel, al noroeste de la misma y siendo este lugar uno de los espacios verdes mas grande Paris. </a:t>
+              <a:t>”, que se trata de un vasto jardín público totalmente abierto situado en el séptimo distrito de Paris, en la cual se encuentra la Torre Eiffel, al noroeste de la misma y siendo este lugar uno de los espacios verdes mas grande Paris. </a:t>
             </a:r>
             <a:endParaRPr lang="en-US" dirty="0"/>
           </a:p>
@@ -4840,8 +4827,8 @@
           <a:lstStyle/>
           <a:p>
             <a:r>
-              <a:rPr lang="es-AR" dirty="0" err="1" smtClean="0"/>
-              <a:t>desafio</a:t>
+              <a:rPr lang="es-AR" dirty="0"/>
+              <a:t>desafío</a:t>
             </a:r>
             <a:endParaRPr lang="en-US" dirty="0"/>
           </a:p>
@@ -4868,104 +4855,32 @@
           <a:lstStyle/>
           <a:p>
             <a:r>
-              <a:rPr lang="es-AR" i="1" dirty="0" smtClean="0"/>
+              <a:rPr lang="es-AR" i="1" dirty="0"/>
               <a:t>Como desafío para este proyecto fue recrear lo mas posible el </a:t>
             </a:r>
             <a:r>
-              <a:rPr lang="en-US" i="1" dirty="0" smtClean="0"/>
+              <a:rPr lang="en-US" i="1" dirty="0"/>
               <a:t>Champ-de-Mars, </a:t>
             </a:r>
             <a:r>
-              <a:rPr lang="en-US" i="1" dirty="0" err="1" smtClean="0"/>
-              <a:t>pero</a:t>
-            </a:r>
-            <a:r>
-              <a:rPr lang="en-US" i="1" dirty="0" smtClean="0"/>
-              <a:t> dado a que se </a:t>
-            </a:r>
-            <a:r>
-              <a:rPr lang="en-US" i="1" dirty="0" err="1" smtClean="0"/>
-              <a:t>encuentra</a:t>
-            </a:r>
-            <a:r>
-              <a:rPr lang="en-US" i="1" dirty="0" smtClean="0"/>
+              <a:rPr lang="es-AR" i="1" dirty="0"/>
+              <a:t>aunque</a:t>
+            </a:r>
+            <a:r>
+              <a:rPr lang="en-US" i="1" dirty="0"/>
+              <a:t> dado </a:t>
+            </a:r>
+            <a:r>
+              <a:rPr lang="es-AR" i="1" dirty="0"/>
+              <a:t>que se encuentra rodeada de plantas, arbustos y arboles, esto aumenta la complejidad de modelar y dar</a:t>
+            </a:r>
+            <a:r>
+              <a:rPr lang="en-US" i="1" dirty="0"/>
               <a:t> </a:t>
             </a:r>
             <a:r>
-              <a:rPr lang="en-US" i="1" dirty="0" err="1" smtClean="0"/>
-              <a:t>rodeada</a:t>
-            </a:r>
-            <a:r>
-              <a:rPr lang="en-US" i="1" dirty="0" smtClean="0"/>
-              <a:t> de </a:t>
-            </a:r>
-            <a:r>
-              <a:rPr lang="en-US" i="1" dirty="0" err="1" smtClean="0"/>
-              <a:t>plantas</a:t>
-            </a:r>
-            <a:r>
-              <a:rPr lang="en-US" i="1" dirty="0" smtClean="0"/>
-              <a:t>, </a:t>
-            </a:r>
-            <a:r>
-              <a:rPr lang="en-US" i="1" dirty="0" err="1" smtClean="0"/>
-              <a:t>arbustos</a:t>
-            </a:r>
-            <a:r>
-              <a:rPr lang="en-US" i="1" dirty="0" smtClean="0"/>
-              <a:t> y </a:t>
-            </a:r>
-            <a:r>
-              <a:rPr lang="en-US" i="1" dirty="0" err="1" smtClean="0"/>
-              <a:t>arboles</a:t>
-            </a:r>
-            <a:r>
-              <a:rPr lang="en-US" i="1" dirty="0" smtClean="0"/>
-              <a:t>, </a:t>
-            </a:r>
-            <a:r>
-              <a:rPr lang="en-US" i="1" dirty="0" err="1" smtClean="0"/>
-              <a:t>esto</a:t>
-            </a:r>
-            <a:r>
-              <a:rPr lang="en-US" i="1" dirty="0" smtClean="0"/>
-              <a:t> </a:t>
-            </a:r>
-            <a:r>
-              <a:rPr lang="en-US" i="1" dirty="0" err="1" smtClean="0"/>
-              <a:t>aumenta</a:t>
-            </a:r>
-            <a:r>
-              <a:rPr lang="en-US" i="1" dirty="0" smtClean="0"/>
-              <a:t> la </a:t>
-            </a:r>
-            <a:r>
-              <a:rPr lang="en-US" i="1" dirty="0" err="1" smtClean="0"/>
-              <a:t>complejidad</a:t>
-            </a:r>
-            <a:r>
-              <a:rPr lang="en-US" i="1" dirty="0" smtClean="0"/>
-              <a:t> de </a:t>
-            </a:r>
-            <a:r>
-              <a:rPr lang="en-US" i="1" dirty="0" err="1" smtClean="0"/>
-              <a:t>modelar</a:t>
-            </a:r>
-            <a:r>
-              <a:rPr lang="en-US" i="1" dirty="0" smtClean="0"/>
-              <a:t> y </a:t>
-            </a:r>
-            <a:r>
-              <a:rPr lang="en-US" i="1" dirty="0" err="1" smtClean="0"/>
-              <a:t>dar</a:t>
-            </a:r>
-            <a:r>
-              <a:rPr lang="en-US" i="1" dirty="0" smtClean="0"/>
-              <a:t> </a:t>
-            </a:r>
-            <a:r>
-              <a:rPr lang="es-AR" i="1" dirty="0" smtClean="0"/>
-              <a:t>color de las plantas. Por lo tanto optamos por considerar este lugar rodeado de edificios y mantener la estética interna del lugar.</a:t>
+              <a:rPr lang="es-AR" i="1" dirty="0"/>
+              <a:t>color a todos los objetos de la escena. Por lo tanto optamos por considerar este lugar rodeado de edificios y mantener la estética interna del lugar.</a:t>
             </a:r>
             <a:endParaRPr lang="en-US" i="1" dirty="0"/>
           </a:p>
@@ -5077,7 +4992,7 @@
           <a:lstStyle/>
           <a:p>
             <a:r>
-              <a:rPr lang="es-AR" dirty="0" smtClean="0"/>
+              <a:rPr lang="es-AR" dirty="0"/>
               <a:t>Construcción de la escena.</a:t>
             </a:r>
             <a:endParaRPr lang="en-US" dirty="0"/>
@@ -5107,44 +5022,40 @@
           <a:lstStyle/>
           <a:p>
             <a:r>
-              <a:rPr lang="es-AR" sz="1800" dirty="0" smtClean="0"/>
+              <a:rPr lang="es-AR" sz="1800" dirty="0"/>
               <a:t>Para la construcción de la escena se utilizaron diferentes objetos descargados de diferentes paginas. </a:t>
             </a:r>
             <a:r>
-              <a:rPr lang="en-US" sz="1800" dirty="0" err="1" smtClean="0"/>
+              <a:rPr lang="en-US" sz="1800" dirty="0" err="1"/>
               <a:t>TurboSquid</a:t>
             </a:r>
             <a:r>
-              <a:rPr lang="en-US" sz="1800" dirty="0" smtClean="0"/>
+              <a:rPr lang="en-US" sz="1800" dirty="0"/>
               <a:t>, </a:t>
             </a:r>
             <a:r>
-              <a:rPr lang="en-US" sz="1800" dirty="0" err="1" smtClean="0"/>
+              <a:rPr lang="en-US" sz="1800" dirty="0" err="1"/>
               <a:t>PolyCount</a:t>
             </a:r>
             <a:r>
-              <a:rPr lang="en-US" sz="1800" dirty="0" smtClean="0"/>
+              <a:rPr lang="en-US" sz="1800" dirty="0"/>
               <a:t> y TF3DM </a:t>
             </a:r>
           </a:p>
           <a:p>
             <a:r>
-              <a:rPr lang="es-AR" sz="1800" dirty="0" smtClean="0"/>
+              <a:rPr lang="es-AR" sz="1800" dirty="0"/>
               <a:t>Los objetos utilizados fueron faroles, tres tipos de edificios</a:t>
             </a:r>
             <a:r>
-              <a:rPr lang="en-US" sz="1800" dirty="0" smtClean="0"/>
+              <a:rPr lang="en-US" sz="1800" dirty="0"/>
               <a:t> </a:t>
             </a:r>
             <a:r>
-              <a:rPr lang="en-US" sz="1800" dirty="0" err="1" smtClean="0"/>
-              <a:t>diferentes</a:t>
-            </a:r>
-            <a:r>
-              <a:rPr lang="es-AR" sz="1800" dirty="0" smtClean="0"/>
-              <a:t>, bancos, y la torre Eiffel.</a:t>
-            </a:r>
-            <a:endParaRPr lang="en-US" sz="1800" dirty="0" smtClean="0"/>
+              <a:rPr lang="es-AR" sz="1800" dirty="0"/>
+              <a:t>diferentes, bancos, y la torre Eiffel.</a:t>
+            </a:r>
+            <a:endParaRPr lang="en-US" sz="1800" dirty="0"/>
           </a:p>
         </p:txBody>
       </p:sp>
@@ -5374,7 +5285,7 @@
           <a:lstStyle/>
           <a:p>
             <a:r>
-              <a:rPr lang="es-AR" dirty="0" smtClean="0"/>
+              <a:rPr lang="es-AR" dirty="0"/>
               <a:t>Tipo de luces</a:t>
             </a:r>
             <a:endParaRPr lang="en-US" dirty="0"/>
@@ -5402,14 +5313,14 @@
           <a:lstStyle/>
           <a:p>
             <a:r>
-              <a:rPr lang="es-AR" dirty="0" smtClean="0"/>
-              <a:t>Incorporamos al menos 2 de las 3 luces pedidas.</a:t>
-            </a:r>
-          </a:p>
-          <a:p>
-            <a:r>
-              <a:rPr lang="es-AR" dirty="0" smtClean="0"/>
-              <a:t>Las luces incorporadas fueron las luces de los faroles, el cual es una luz puntual por cada faro que se encuentra en la escena, y además una luz direccional la cual se encuentra en primera instancia por sobre la torre simulando la luz ambiental del momento del día.</a:t>
+              <a:rPr lang="es-AR" dirty="0"/>
+              <a:t>Incorporamos al menos 2 de las 3 luces pedidas (Direccional y Puntual).</a:t>
+            </a:r>
+          </a:p>
+          <a:p>
+            <a:r>
+              <a:rPr lang="es-AR" dirty="0"/>
+              <a:t>Las luces puntuales incorporadas fueron las luces de los faroles, a las que se les incorporó una atenuación linear y cuadrática. Por otro lado existe una luz direccional se encuentra en primera instancia por sobre la torre.</a:t>
             </a:r>
             <a:endParaRPr lang="en-US" dirty="0"/>
           </a:p>
@@ -5437,8 +5348,8 @@
         </p:blipFill>
         <p:spPr>
           <a:xfrm>
-            <a:off x="6765589" y="3749038"/>
-            <a:ext cx="3042648" cy="2266541"/>
+            <a:off x="6765589" y="3840151"/>
+            <a:ext cx="2764777" cy="2059548"/>
           </a:xfrm>
           <a:prstGeom prst="rect">
             <a:avLst/>
@@ -5467,8 +5378,8 @@
         </p:blipFill>
         <p:spPr>
           <a:xfrm>
-            <a:off x="2200548" y="3775164"/>
-            <a:ext cx="2933156" cy="2210922"/>
+            <a:off x="2239184" y="3840151"/>
+            <a:ext cx="2641908" cy="1991388"/>
           </a:xfrm>
           <a:prstGeom prst="rect">
             <a:avLst/>
@@ -5549,8 +5460,8 @@
           <a:lstStyle/>
           <a:p>
             <a:r>
-              <a:rPr lang="es-AR" dirty="0" smtClean="0"/>
-              <a:t>Por el lado del modelado de luz hicimos que las luces puntuales reflejen y demuestren su intensidad en el suelo y los edificios. Pudiendo variar los parámetros de las luces de diferente manera, siempre manteniendo una imagen coherente.</a:t>
+              <a:rPr lang="es-AR" dirty="0"/>
+              <a:t>Para el modelado de luz logramos hacer que las luces puntuales reflejen y demuestren su intensidad en el suelo y los edificios. Pudiendo variar los parámetros de las luces de diferente manera, siempre manteniendo una imagen coherente.</a:t>
             </a:r>
             <a:endParaRPr lang="en-US" dirty="0"/>
           </a:p>
@@ -5691,27 +5602,7 @@
           <a:p>
             <a:r>
               <a:rPr lang="es-ES" dirty="0"/>
-              <a:t>Las luces </a:t>
-            </a:r>
-            <a:r>
-              <a:rPr lang="es-ES" dirty="0" smtClean="0"/>
-              <a:t>se </a:t>
-            </a:r>
-            <a:r>
-              <a:rPr lang="es-ES" dirty="0"/>
-              <a:t>integran adecuadamente en cuanto a su intensidad en el contexto de múltiples luces, permitiendo apreciar adecuadamente las características de los distintos materiales y texturas. </a:t>
-            </a:r>
-            <a:r>
-              <a:rPr lang="es-ES" dirty="0" smtClean="0"/>
-              <a:t>Gracias a esto también podemos ver reflejada las luces en los otros postes de otras luces, </a:t>
-            </a:r>
-            <a:r>
-              <a:rPr lang="es-ES" dirty="0" err="1" smtClean="0"/>
-              <a:t>asi</a:t>
-            </a:r>
-            <a:r>
-              <a:rPr lang="es-ES" dirty="0" smtClean="0"/>
-              <a:t> como también verlo reflejado en la torre.</a:t>
+              <a:t>Las luces se integran adecuadamente en cuanto a su intensidad en el contexto de múltiples luces, permitiendo apreciar adecuadamente las características de los distintos materiales y texturas. Gracias a esto también podemos ver reflejada las luces en los otros postes de otras luces, así como también verlo reflejado en la torre.</a:t>
             </a:r>
             <a:endParaRPr lang="en-US" dirty="0"/>
           </a:p>
@@ -5823,7 +5714,7 @@
           <a:lstStyle/>
           <a:p>
             <a:r>
-              <a:rPr lang="es-AR" dirty="0" smtClean="0"/>
+              <a:rPr lang="es-AR" dirty="0"/>
               <a:t>Material</a:t>
             </a:r>
             <a:endParaRPr lang="en-US" dirty="0"/>
@@ -5851,27 +5742,18 @@
           <a:lstStyle/>
           <a:p>
             <a:r>
-              <a:rPr lang="es-AR" dirty="0" smtClean="0"/>
+              <a:rPr lang="es-AR" dirty="0"/>
               <a:t>Para este punto optamos por utilizar materiales para la construcción de la torre y de los faroles. </a:t>
             </a:r>
-            <a:endParaRPr lang="es-AR" dirty="0"/>
           </a:p>
           <a:p>
             <a:r>
               <a:rPr lang="es-AR" dirty="0"/>
-              <a:t>En el caso de la torre intentamos darle un aspecto de </a:t>
-            </a:r>
-            <a:r>
-              <a:rPr lang="es-AR" dirty="0" smtClean="0"/>
-              <a:t>oxido y en el caso del faro un aspecto perlado en donde se encuentra la cúpula de luz, </a:t>
-            </a:r>
-            <a:r>
-              <a:rPr lang="es-AR" dirty="0"/>
-              <a:t>buscando los diferentes valores de </a:t>
+              <a:t>En el caso de la torre intentamos darle un aspecto de oxido y en el caso del faro un aspecto perlado en donde se encuentra la cúpula de luz, con los valores correspondientes de</a:t>
             </a:r>
             <a:r>
               <a:rPr lang="es-AR" i="1" dirty="0"/>
-              <a:t>“m”, “f0”, “</a:t>
+              <a:t> “f0”, “</a:t>
             </a:r>
             <a:r>
               <a:rPr lang="es-AR" i="1" dirty="0" err="1"/>
@@ -5879,15 +5761,7 @@
             </a:r>
             <a:r>
               <a:rPr lang="es-AR" i="1" dirty="0"/>
-              <a:t>”, “</a:t>
-            </a:r>
-            <a:r>
-              <a:rPr lang="es-AR" i="1" dirty="0" err="1"/>
-              <a:t>ks</a:t>
-            </a:r>
-            <a:r>
-              <a:rPr lang="es-AR" i="1" dirty="0"/>
-              <a:t>”</a:t>
+              <a:t>”, “ks”</a:t>
             </a:r>
             <a:r>
               <a:rPr lang="es-AR" dirty="0"/>
@@ -5899,11 +5773,7 @@
             </a:r>
             <a:r>
               <a:rPr lang="es-AR" dirty="0"/>
-              <a:t> que utilizamos de </a:t>
-            </a:r>
-            <a:r>
-              <a:rPr lang="es-AR" dirty="0" smtClean="0"/>
-              <a:t>Cook-Torrance.</a:t>
+              <a:t> que utilizamos de Cook-Torrance.</a:t>
             </a:r>
             <a:endParaRPr lang="en-US" dirty="0">
               <a:hlinkClick r:id="rId2"/>

</xml_diff>